<commit_message>
continued refactoring.  completely unstable
</commit_message>
<xml_diff>
--- a/docs/figures.pptx
+++ b/docs/figures.pptx
@@ -6,6 +6,8 @@
   </p:sldMasterIdLst>
   <p:sldIdLst>
     <p:sldId id="256" r:id="rId2"/>
+    <p:sldId id="257" r:id="rId3"/>
+    <p:sldId id="258" r:id="rId4"/>
   </p:sldIdLst>
   <p:sldSz cx="9144000" cy="6858000" type="screen4x3"/>
   <p:notesSz cx="6858000" cy="9144000"/>
@@ -3244,8 +3246,8 @@
         </p:nvSpPr>
         <p:spPr>
           <a:xfrm>
-            <a:off x="7015829" y="1469534"/>
-            <a:ext cx="1199011" cy="2340466"/>
+            <a:off x="7149630" y="1469534"/>
+            <a:ext cx="987777" cy="2340466"/>
           </a:xfrm>
           <a:prstGeom prst="roundRect">
             <a:avLst/>
@@ -3293,8 +3295,8 @@
         </p:nvSpPr>
         <p:spPr>
           <a:xfrm>
-            <a:off x="6813486" y="4360486"/>
-            <a:ext cx="1603698" cy="748691"/>
+            <a:off x="1027136" y="5466142"/>
+            <a:ext cx="1055988" cy="748691"/>
           </a:xfrm>
           <a:prstGeom prst="roundRect">
             <a:avLst/>
@@ -3323,21 +3325,6 @@
               <a:rPr lang="en-US" sz="1600" dirty="0" err="1" smtClean="0"/>
               <a:t>Geom</a:t>
             </a:r>
-            <a:r>
-              <a:rPr lang="en-US" sz="1600" dirty="0" smtClean="0"/>
-              <a:t>:</a:t>
-            </a:r>
-          </a:p>
-          <a:p>
-            <a:pPr algn="ctr"/>
-            <a:r>
-              <a:rPr lang="en-US" sz="1600" dirty="0" smtClean="0"/>
-              <a:t>Data -&gt; </a:t>
-            </a:r>
-            <a:r>
-              <a:rPr lang="en-US" sz="1600" dirty="0" err="1" smtClean="0"/>
-              <a:t>geom</a:t>
-            </a:r>
             <a:endParaRPr lang="en-US" sz="1600" dirty="0" smtClean="0"/>
           </a:p>
         </p:txBody>
@@ -3350,7 +3337,7 @@
         </p:nvSpPr>
         <p:spPr>
           <a:xfrm>
-            <a:off x="4848361" y="4365694"/>
+            <a:off x="2379864" y="5461367"/>
             <a:ext cx="1118680" cy="748691"/>
           </a:xfrm>
           <a:prstGeom prst="roundRect">
@@ -3384,138 +3371,6 @@
               <a:rPr lang="en-US" sz="1600" dirty="0" smtClean="0"/>
               <a:t>osition</a:t>
             </a:r>
-          </a:p>
-        </p:txBody>
-      </p:sp>
-      <p:sp>
-        <p:nvSpPr>
-          <p:cNvPr id="11" name="Rounded Rectangle 10"/>
-          <p:cNvSpPr/>
-          <p:nvPr/>
-        </p:nvSpPr>
-        <p:spPr>
-          <a:xfrm>
-            <a:off x="2920349" y="4378644"/>
-            <a:ext cx="1342325" cy="748691"/>
-          </a:xfrm>
-          <a:prstGeom prst="roundRect">
-            <a:avLst/>
-          </a:prstGeom>
-        </p:spPr>
-        <p:style>
-          <a:lnRef idx="2">
-            <a:schemeClr val="accent1"/>
-          </a:lnRef>
-          <a:fillRef idx="1">
-            <a:schemeClr val="lt1"/>
-          </a:fillRef>
-          <a:effectRef idx="0">
-            <a:schemeClr val="accent1"/>
-          </a:effectRef>
-          <a:fontRef idx="minor">
-            <a:schemeClr val="dk1"/>
-          </a:fontRef>
-        </p:style>
-        <p:txBody>
-          <a:bodyPr rtlCol="0" anchor="ctr"/>
-          <a:lstStyle/>
-          <a:p>
-            <a:pPr algn="ctr"/>
-            <a:r>
-              <a:rPr lang="en-US" sz="1600" dirty="0" smtClean="0"/>
-              <a:t>Coordinate transform</a:t>
-            </a:r>
-          </a:p>
-        </p:txBody>
-      </p:sp>
-      <p:sp>
-        <p:nvSpPr>
-          <p:cNvPr id="12" name="Rounded Rectangle 11"/>
-          <p:cNvSpPr/>
-          <p:nvPr/>
-        </p:nvSpPr>
-        <p:spPr>
-          <a:xfrm>
-            <a:off x="611656" y="4369597"/>
-            <a:ext cx="1425149" cy="748691"/>
-          </a:xfrm>
-          <a:prstGeom prst="roundRect">
-            <a:avLst/>
-          </a:prstGeom>
-        </p:spPr>
-        <p:style>
-          <a:lnRef idx="2">
-            <a:schemeClr val="accent1"/>
-          </a:lnRef>
-          <a:fillRef idx="1">
-            <a:schemeClr val="lt1"/>
-          </a:fillRef>
-          <a:effectRef idx="0">
-            <a:schemeClr val="accent1"/>
-          </a:effectRef>
-          <a:fontRef idx="minor">
-            <a:schemeClr val="dk1"/>
-          </a:fontRef>
-        </p:style>
-        <p:txBody>
-          <a:bodyPr rtlCol="0" anchor="ctr"/>
-          <a:lstStyle/>
-          <a:p>
-            <a:pPr algn="ctr"/>
-            <a:r>
-              <a:rPr lang="en-US" sz="1600" dirty="0" smtClean="0"/>
-              <a:t>Aesthetics:</a:t>
-            </a:r>
-          </a:p>
-          <a:p>
-            <a:pPr algn="ctr"/>
-            <a:r>
-              <a:rPr lang="en-US" sz="1600" dirty="0" smtClean="0"/>
-              <a:t>Color/Texture</a:t>
-            </a:r>
-          </a:p>
-        </p:txBody>
-      </p:sp>
-      <p:sp>
-        <p:nvSpPr>
-          <p:cNvPr id="13" name="TextBox 12"/>
-          <p:cNvSpPr txBox="1"/>
-          <p:nvPr/>
-        </p:nvSpPr>
-        <p:spPr>
-          <a:xfrm>
-            <a:off x="-1333603" y="4570763"/>
-            <a:ext cx="1168108" cy="338554"/>
-          </a:xfrm>
-          <a:prstGeom prst="rect">
-            <a:avLst/>
-          </a:prstGeom>
-        </p:spPr>
-        <p:style>
-          <a:lnRef idx="2">
-            <a:schemeClr val="dk1"/>
-          </a:lnRef>
-          <a:fillRef idx="1">
-            <a:schemeClr val="lt1"/>
-          </a:fillRef>
-          <a:effectRef idx="0">
-            <a:schemeClr val="dk1"/>
-          </a:effectRef>
-          <a:fontRef idx="minor">
-            <a:schemeClr val="dk1"/>
-          </a:fontRef>
-        </p:style>
-        <p:txBody>
-          <a:bodyPr wrap="none" rtlCol="0">
-            <a:spAutoFit/>
-          </a:bodyPr>
-          <a:lstStyle/>
-          <a:p>
-            <a:r>
-              <a:rPr lang="en-US" sz="1600" dirty="0" smtClean="0"/>
-              <a:t>SVG/canvas</a:t>
-            </a:r>
-            <a:endParaRPr lang="en-US" sz="1600" dirty="0"/>
           </a:p>
         </p:txBody>
       </p:sp>
@@ -3593,88 +3448,17 @@
       </p:cxnSp>
       <p:cxnSp>
         <p:nvCxnSpPr>
-          <p:cNvPr id="23" name="Straight Arrow Connector 22"/>
-          <p:cNvCxnSpPr>
-            <a:stCxn id="87" idx="3"/>
-          </p:cNvCxnSpPr>
-          <p:nvPr/>
-        </p:nvCxnSpPr>
-        <p:spPr>
-          <a:xfrm>
-            <a:off x="8748508" y="-15139"/>
-            <a:ext cx="336941" cy="1110"/>
-          </a:xfrm>
-          <a:prstGeom prst="straightConnector1">
-            <a:avLst/>
-          </a:prstGeom>
-          <a:ln>
-            <a:tailEnd type="arrow"/>
-          </a:ln>
-        </p:spPr>
-        <p:style>
-          <a:lnRef idx="2">
-            <a:schemeClr val="dk1"/>
-          </a:lnRef>
-          <a:fillRef idx="1">
-            <a:schemeClr val="lt1"/>
-          </a:fillRef>
-          <a:effectRef idx="0">
-            <a:schemeClr val="dk1"/>
-          </a:effectRef>
-          <a:fontRef idx="minor">
-            <a:schemeClr val="dk1"/>
-          </a:fontRef>
-        </p:style>
-      </p:cxnSp>
-      <p:cxnSp>
-        <p:nvCxnSpPr>
-          <p:cNvPr id="26" name="Straight Arrow Connector 25"/>
-          <p:cNvCxnSpPr>
-            <a:stCxn id="7" idx="2"/>
-            <a:endCxn id="9" idx="0"/>
-          </p:cNvCxnSpPr>
-          <p:nvPr/>
-        </p:nvCxnSpPr>
-        <p:spPr>
-          <a:xfrm>
-            <a:off x="7615335" y="3810000"/>
-            <a:ext cx="0" cy="550486"/>
-          </a:xfrm>
-          <a:prstGeom prst="straightConnector1">
-            <a:avLst/>
-          </a:prstGeom>
-          <a:ln>
-            <a:tailEnd type="arrow"/>
-          </a:ln>
-        </p:spPr>
-        <p:style>
-          <a:lnRef idx="2">
-            <a:schemeClr val="dk1"/>
-          </a:lnRef>
-          <a:fillRef idx="1">
-            <a:schemeClr val="lt1"/>
-          </a:fillRef>
-          <a:effectRef idx="0">
-            <a:schemeClr val="dk1"/>
-          </a:effectRef>
-          <a:fontRef idx="minor">
-            <a:schemeClr val="dk1"/>
-          </a:fontRef>
-        </p:style>
-      </p:cxnSp>
-      <p:cxnSp>
-        <p:nvCxnSpPr>
           <p:cNvPr id="30" name="Straight Arrow Connector 29"/>
           <p:cNvCxnSpPr>
-            <a:stCxn id="9" idx="1"/>
-            <a:endCxn id="10" idx="3"/>
+            <a:stCxn id="312" idx="3"/>
+            <a:endCxn id="9" idx="1"/>
           </p:cNvCxnSpPr>
           <p:nvPr/>
         </p:nvCxnSpPr>
         <p:spPr>
-          <a:xfrm flipH="1">
-            <a:off x="5967041" y="4734832"/>
-            <a:ext cx="846445" cy="5208"/>
+          <a:xfrm>
+            <a:off x="615569" y="5837592"/>
+            <a:ext cx="411567" cy="2896"/>
           </a:xfrm>
           <a:prstGeom prst="straightConnector1">
             <a:avLst/>
@@ -3702,15 +3486,15 @@
         <p:nvCxnSpPr>
           <p:cNvPr id="33" name="Straight Arrow Connector 32"/>
           <p:cNvCxnSpPr>
-            <a:stCxn id="10" idx="1"/>
-            <a:endCxn id="11" idx="3"/>
+            <a:stCxn id="9" idx="3"/>
+            <a:endCxn id="10" idx="1"/>
           </p:cNvCxnSpPr>
           <p:nvPr/>
         </p:nvCxnSpPr>
         <p:spPr>
-          <a:xfrm flipH="1">
-            <a:off x="4262674" y="4740040"/>
-            <a:ext cx="585687" cy="12950"/>
+          <a:xfrm flipV="1">
+            <a:off x="2083124" y="5835713"/>
+            <a:ext cx="296740" cy="4775"/>
           </a:xfrm>
           <a:prstGeom prst="straightConnector1">
             <a:avLst/>
@@ -3738,15 +3522,15 @@
         <p:nvCxnSpPr>
           <p:cNvPr id="36" name="Straight Arrow Connector 35"/>
           <p:cNvCxnSpPr>
-            <a:stCxn id="11" idx="1"/>
-            <a:endCxn id="12" idx="3"/>
+            <a:stCxn id="10" idx="3"/>
+            <a:endCxn id="304" idx="1"/>
           </p:cNvCxnSpPr>
           <p:nvPr/>
         </p:nvCxnSpPr>
         <p:spPr>
-          <a:xfrm flipH="1" flipV="1">
-            <a:off x="2036805" y="4743943"/>
-            <a:ext cx="883544" cy="9047"/>
+          <a:xfrm>
+            <a:off x="3498544" y="5835713"/>
+            <a:ext cx="518574" cy="3714"/>
           </a:xfrm>
           <a:prstGeom prst="straightConnector1">
             <a:avLst/>
@@ -3774,15 +3558,15 @@
         <p:nvCxnSpPr>
           <p:cNvPr id="39" name="Straight Arrow Connector 38"/>
           <p:cNvCxnSpPr>
-            <a:stCxn id="12" idx="1"/>
-            <a:endCxn id="13" idx="3"/>
+            <a:stCxn id="322" idx="3"/>
+            <a:endCxn id="327" idx="1"/>
           </p:cNvCxnSpPr>
           <p:nvPr/>
         </p:nvCxnSpPr>
         <p:spPr>
-          <a:xfrm flipH="1" flipV="1">
-            <a:off x="-165495" y="4740040"/>
-            <a:ext cx="777151" cy="3903"/>
+          <a:xfrm>
+            <a:off x="8382289" y="5830020"/>
+            <a:ext cx="270258" cy="0"/>
           </a:xfrm>
           <a:prstGeom prst="straightConnector1">
             <a:avLst/>
@@ -3808,14 +3592,14 @@
       </p:cxnSp>
       <p:sp>
         <p:nvSpPr>
-          <p:cNvPr id="87" name="Rounded Rectangle 86"/>
+          <p:cNvPr id="132" name="Rounded Rectangle 131"/>
           <p:cNvSpPr/>
           <p:nvPr/>
         </p:nvSpPr>
         <p:spPr>
           <a:xfrm>
-            <a:off x="7475040" y="-385582"/>
-            <a:ext cx="1273468" cy="740885"/>
+            <a:off x="-1060800" y="2268392"/>
+            <a:ext cx="1039118" cy="740885"/>
           </a:xfrm>
           <a:prstGeom prst="roundRect">
             <a:avLst/>
@@ -3842,84 +3626,7 @@
             <a:pPr algn="ctr"/>
             <a:r>
               <a:rPr lang="en-US" sz="1600" dirty="0" smtClean="0"/>
-              <a:t>Join: facets</a:t>
-            </a:r>
-            <a:endParaRPr lang="en-US" sz="1600" dirty="0"/>
-          </a:p>
-        </p:txBody>
-      </p:sp>
-      <p:cxnSp>
-        <p:nvCxnSpPr>
-          <p:cNvPr id="88" name="Straight Arrow Connector 87"/>
-          <p:cNvCxnSpPr>
-            <a:endCxn id="87" idx="1"/>
-          </p:cNvCxnSpPr>
-          <p:nvPr/>
-        </p:nvCxnSpPr>
-        <p:spPr>
-          <a:xfrm flipV="1">
-            <a:off x="6453481" y="-15139"/>
-            <a:ext cx="1021559" cy="5756"/>
-          </a:xfrm>
-          <a:prstGeom prst="straightConnector1">
-            <a:avLst/>
-          </a:prstGeom>
-          <a:ln>
-            <a:tailEnd type="arrow"/>
-          </a:ln>
-        </p:spPr>
-        <p:style>
-          <a:lnRef idx="2">
-            <a:schemeClr val="dk1"/>
-          </a:lnRef>
-          <a:fillRef idx="1">
-            <a:schemeClr val="lt1"/>
-          </a:fillRef>
-          <a:effectRef idx="0">
-            <a:schemeClr val="dk1"/>
-          </a:effectRef>
-          <a:fontRef idx="minor">
-            <a:schemeClr val="dk1"/>
-          </a:fontRef>
-        </p:style>
-      </p:cxnSp>
-      <p:sp>
-        <p:nvSpPr>
-          <p:cNvPr id="132" name="Rounded Rectangle 131"/>
-          <p:cNvSpPr/>
-          <p:nvPr/>
-        </p:nvSpPr>
-        <p:spPr>
-          <a:xfrm>
-            <a:off x="-1060800" y="2268392"/>
-            <a:ext cx="1039118" cy="740885"/>
-          </a:xfrm>
-          <a:prstGeom prst="roundRect">
-            <a:avLst/>
-          </a:prstGeom>
-        </p:spPr>
-        <p:style>
-          <a:lnRef idx="2">
-            <a:schemeClr val="dk1"/>
-          </a:lnRef>
-          <a:fillRef idx="1">
-            <a:schemeClr val="lt1"/>
-          </a:fillRef>
-          <a:effectRef idx="0">
-            <a:schemeClr val="dk1"/>
-          </a:effectRef>
-          <a:fontRef idx="minor">
-            <a:schemeClr val="dk1"/>
-          </a:fontRef>
-        </p:style>
-        <p:txBody>
-          <a:bodyPr rtlCol="0" anchor="ctr"/>
-          <a:lstStyle/>
-          <a:p>
-            <a:pPr algn="ctr"/>
-            <a:r>
-              <a:rPr lang="en-US" sz="1600" dirty="0" smtClean="0"/>
-              <a:t>Facets</a:t>
+              <a:t>Split on Facets</a:t>
             </a:r>
             <a:endParaRPr lang="en-US" sz="1600" dirty="0"/>
           </a:p>
@@ -4091,136 +3798,6 @@
           </a:p>
         </p:txBody>
       </p:sp>
-      <p:cxnSp>
-        <p:nvCxnSpPr>
-          <p:cNvPr id="159" name="Straight Arrow Connector 158"/>
-          <p:cNvCxnSpPr>
-            <a:endCxn id="87" idx="1"/>
-          </p:cNvCxnSpPr>
-          <p:nvPr/>
-        </p:nvCxnSpPr>
-        <p:spPr>
-          <a:xfrm>
-            <a:off x="6968692" y="-697233"/>
-            <a:ext cx="506348" cy="682094"/>
-          </a:xfrm>
-          <a:prstGeom prst="straightConnector1">
-            <a:avLst/>
-          </a:prstGeom>
-          <a:ln>
-            <a:tailEnd type="arrow"/>
-          </a:ln>
-        </p:spPr>
-        <p:style>
-          <a:lnRef idx="2">
-            <a:schemeClr val="dk1"/>
-          </a:lnRef>
-          <a:fillRef idx="0">
-            <a:schemeClr val="dk1"/>
-          </a:fillRef>
-          <a:effectRef idx="1">
-            <a:schemeClr val="dk1"/>
-          </a:effectRef>
-          <a:fontRef idx="minor">
-            <a:schemeClr val="tx1"/>
-          </a:fontRef>
-        </p:style>
-      </p:cxnSp>
-      <p:cxnSp>
-        <p:nvCxnSpPr>
-          <p:cNvPr id="162" name="Straight Arrow Connector 161"/>
-          <p:cNvCxnSpPr>
-            <a:endCxn id="87" idx="1"/>
-          </p:cNvCxnSpPr>
-          <p:nvPr/>
-        </p:nvCxnSpPr>
-        <p:spPr>
-          <a:xfrm flipV="1">
-            <a:off x="6968692" y="-15139"/>
-            <a:ext cx="506348" cy="860722"/>
-          </a:xfrm>
-          <a:prstGeom prst="straightConnector1">
-            <a:avLst/>
-          </a:prstGeom>
-          <a:ln>
-            <a:tailEnd type="arrow"/>
-          </a:ln>
-        </p:spPr>
-        <p:style>
-          <a:lnRef idx="2">
-            <a:schemeClr val="dk1"/>
-          </a:lnRef>
-          <a:fillRef idx="0">
-            <a:schemeClr val="dk1"/>
-          </a:fillRef>
-          <a:effectRef idx="1">
-            <a:schemeClr val="dk1"/>
-          </a:effectRef>
-          <a:fontRef idx="minor">
-            <a:schemeClr val="tx1"/>
-          </a:fontRef>
-        </p:style>
-      </p:cxnSp>
-      <p:sp>
-        <p:nvSpPr>
-          <p:cNvPr id="170" name="TextBox 169"/>
-          <p:cNvSpPr txBox="1"/>
-          <p:nvPr/>
-        </p:nvSpPr>
-        <p:spPr>
-          <a:xfrm>
-            <a:off x="6316498" y="355303"/>
-            <a:ext cx="619956" cy="646331"/>
-          </a:xfrm>
-          <a:prstGeom prst="rect">
-            <a:avLst/>
-          </a:prstGeom>
-          <a:noFill/>
-        </p:spPr>
-        <p:txBody>
-          <a:bodyPr wrap="none" rtlCol="0">
-            <a:spAutoFit/>
-          </a:bodyPr>
-          <a:lstStyle/>
-          <a:p>
-            <a:r>
-              <a:rPr lang="en-US" sz="3600" dirty="0" smtClean="0"/>
-              <a:t>….</a:t>
-            </a:r>
-            <a:endParaRPr lang="en-US" sz="3600" dirty="0"/>
-          </a:p>
-        </p:txBody>
-      </p:sp>
-      <p:sp>
-        <p:nvSpPr>
-          <p:cNvPr id="171" name="TextBox 170"/>
-          <p:cNvSpPr txBox="1"/>
-          <p:nvPr/>
-        </p:nvSpPr>
-        <p:spPr>
-          <a:xfrm>
-            <a:off x="6365727" y="-1175902"/>
-            <a:ext cx="619956" cy="646331"/>
-          </a:xfrm>
-          <a:prstGeom prst="rect">
-            <a:avLst/>
-          </a:prstGeom>
-          <a:noFill/>
-        </p:spPr>
-        <p:txBody>
-          <a:bodyPr wrap="none" rtlCol="0">
-            <a:spAutoFit/>
-          </a:bodyPr>
-          <a:lstStyle/>
-          <a:p>
-            <a:r>
-              <a:rPr lang="en-US" sz="3600" dirty="0" smtClean="0"/>
-              <a:t>….</a:t>
-            </a:r>
-            <a:endParaRPr lang="en-US" sz="3600" dirty="0"/>
-          </a:p>
-        </p:txBody>
-      </p:sp>
       <p:sp>
         <p:nvSpPr>
           <p:cNvPr id="188" name="Rounded Rectangle 187"/>
@@ -4575,124 +4152,19 @@
           </a:fontRef>
         </p:style>
       </p:cxnSp>
-      <p:sp>
-        <p:nvSpPr>
-          <p:cNvPr id="230" name="Rounded Rectangle 229"/>
-          <p:cNvSpPr/>
-          <p:nvPr/>
-        </p:nvSpPr>
-        <p:spPr>
-          <a:xfrm>
-            <a:off x="8653961" y="6487557"/>
-            <a:ext cx="1039118" cy="740885"/>
-          </a:xfrm>
-          <a:prstGeom prst="roundRect">
-            <a:avLst/>
-          </a:prstGeom>
-        </p:spPr>
-        <p:style>
-          <a:lnRef idx="2">
-            <a:schemeClr val="dk1"/>
-          </a:lnRef>
-          <a:fillRef idx="1">
-            <a:schemeClr val="lt1"/>
-          </a:fillRef>
-          <a:effectRef idx="0">
-            <a:schemeClr val="dk1"/>
-          </a:effectRef>
-          <a:fontRef idx="minor">
-            <a:schemeClr val="dk1"/>
-          </a:fontRef>
-        </p:style>
-        <p:txBody>
-          <a:bodyPr rtlCol="0" anchor="ctr"/>
-          <a:lstStyle/>
-          <a:p>
-            <a:pPr algn="ctr"/>
-            <a:r>
-              <a:rPr lang="en-US" sz="1600" dirty="0" smtClean="0"/>
-              <a:t>Split on Facets</a:t>
-            </a:r>
-            <a:endParaRPr lang="en-US" sz="1600" dirty="0"/>
-          </a:p>
-        </p:txBody>
-      </p:sp>
       <p:cxnSp>
         <p:nvCxnSpPr>
           <p:cNvPr id="232" name="Straight Arrow Connector 231"/>
-          <p:cNvCxnSpPr/>
+          <p:cNvCxnSpPr>
+            <a:stCxn id="321" idx="3"/>
+            <a:endCxn id="322" idx="1"/>
+          </p:cNvCxnSpPr>
           <p:nvPr/>
         </p:nvCxnSpPr>
         <p:spPr>
-          <a:xfrm flipH="1">
-            <a:off x="7475040" y="6867407"/>
-            <a:ext cx="1178921" cy="3903"/>
-          </a:xfrm>
-          <a:prstGeom prst="straightConnector1">
-            <a:avLst/>
-          </a:prstGeom>
-          <a:ln>
-            <a:tailEnd type="arrow"/>
-          </a:ln>
-        </p:spPr>
-        <p:style>
-          <a:lnRef idx="2">
-            <a:schemeClr val="dk1"/>
-          </a:lnRef>
-          <a:fillRef idx="1">
-            <a:schemeClr val="lt1"/>
-          </a:fillRef>
-          <a:effectRef idx="0">
-            <a:schemeClr val="dk1"/>
-          </a:effectRef>
-          <a:fontRef idx="minor">
-            <a:schemeClr val="dk1"/>
-          </a:fontRef>
-        </p:style>
-      </p:cxnSp>
-      <p:cxnSp>
-        <p:nvCxnSpPr>
-          <p:cNvPr id="235" name="Straight Arrow Connector 234"/>
-          <p:cNvCxnSpPr/>
-          <p:nvPr/>
-        </p:nvCxnSpPr>
-        <p:spPr>
-          <a:xfrm flipH="1" flipV="1">
-            <a:off x="7475040" y="6163158"/>
-            <a:ext cx="1178921" cy="704249"/>
-          </a:xfrm>
-          <a:prstGeom prst="straightConnector1">
-            <a:avLst/>
-          </a:prstGeom>
-          <a:ln>
-            <a:tailEnd type="arrow"/>
-          </a:ln>
-        </p:spPr>
-        <p:style>
-          <a:lnRef idx="2">
-            <a:schemeClr val="dk1"/>
-          </a:lnRef>
-          <a:fillRef idx="1">
-            <a:schemeClr val="lt1"/>
-          </a:fillRef>
-          <a:effectRef idx="0">
-            <a:schemeClr val="dk1"/>
-          </a:effectRef>
-          <a:fontRef idx="minor">
-            <a:schemeClr val="dk1"/>
-          </a:fontRef>
-        </p:style>
-      </p:cxnSp>
-      <p:cxnSp>
-        <p:nvCxnSpPr>
-          <p:cNvPr id="238" name="Straight Arrow Connector 237"/>
-          <p:cNvCxnSpPr/>
-          <p:nvPr/>
-        </p:nvCxnSpPr>
-        <p:spPr>
-          <a:xfrm flipH="1">
-            <a:off x="7475040" y="6867407"/>
-            <a:ext cx="1178921" cy="644896"/>
+          <a:xfrm flipV="1">
+            <a:off x="6650354" y="5830020"/>
+            <a:ext cx="306786" cy="5693"/>
           </a:xfrm>
           <a:prstGeom prst="straightConnector1">
             <a:avLst/>
@@ -4860,7 +4332,7 @@
         <p:spPr>
           <a:xfrm>
             <a:off x="6453481" y="2634074"/>
-            <a:ext cx="562348" cy="5693"/>
+            <a:ext cx="696149" cy="5693"/>
           </a:xfrm>
           <a:prstGeom prst="straightConnector1">
             <a:avLst/>
@@ -4892,7 +4364,7 @@
         </p:nvCxnSpPr>
         <p:spPr>
           <a:xfrm flipV="1">
-            <a:off x="6375831" y="1762508"/>
+            <a:off x="6507529" y="1762508"/>
             <a:ext cx="639998" cy="5756"/>
           </a:xfrm>
           <a:prstGeom prst="straightConnector1">
@@ -4925,7 +4397,7 @@
         </p:nvCxnSpPr>
         <p:spPr>
           <a:xfrm flipV="1">
-            <a:off x="6375831" y="3651405"/>
+            <a:off x="6507529" y="3651405"/>
             <a:ext cx="639998" cy="7746"/>
           </a:xfrm>
           <a:prstGeom prst="straightConnector1">
@@ -5010,10 +4482,1954 @@
           </a:p>
         </p:txBody>
       </p:sp>
+      <p:sp>
+        <p:nvSpPr>
+          <p:cNvPr id="304" name="Rounded Rectangle 303"/>
+          <p:cNvSpPr/>
+          <p:nvPr/>
+        </p:nvSpPr>
+        <p:spPr>
+          <a:xfrm>
+            <a:off x="4017118" y="4830894"/>
+            <a:ext cx="867269" cy="2017065"/>
+          </a:xfrm>
+          <a:prstGeom prst="roundRect">
+            <a:avLst/>
+          </a:prstGeom>
+        </p:spPr>
+        <p:style>
+          <a:lnRef idx="2">
+            <a:schemeClr val="accent1"/>
+          </a:lnRef>
+          <a:fillRef idx="1">
+            <a:schemeClr val="lt1"/>
+          </a:fillRef>
+          <a:effectRef idx="0">
+            <a:schemeClr val="accent1"/>
+          </a:effectRef>
+          <a:fontRef idx="minor">
+            <a:schemeClr val="dk1"/>
+          </a:fontRef>
+        </p:style>
+        <p:txBody>
+          <a:bodyPr rtlCol="0" anchor="ctr"/>
+          <a:lstStyle/>
+          <a:p>
+            <a:pPr algn="ctr"/>
+            <a:r>
+              <a:rPr lang="en-US" sz="1600" dirty="0" smtClean="0"/>
+              <a:t>Layout Facets</a:t>
+            </a:r>
+          </a:p>
+        </p:txBody>
+      </p:sp>
+      <p:cxnSp>
+        <p:nvCxnSpPr>
+          <p:cNvPr id="305" name="Straight Arrow Connector 304"/>
+          <p:cNvCxnSpPr/>
+          <p:nvPr/>
+        </p:nvCxnSpPr>
+        <p:spPr>
+          <a:xfrm>
+            <a:off x="8137407" y="2628209"/>
+            <a:ext cx="696149" cy="5693"/>
+          </a:xfrm>
+          <a:prstGeom prst="straightConnector1">
+            <a:avLst/>
+          </a:prstGeom>
+          <a:ln>
+            <a:tailEnd type="arrow"/>
+          </a:ln>
+        </p:spPr>
+        <p:style>
+          <a:lnRef idx="2">
+            <a:schemeClr val="dk1"/>
+          </a:lnRef>
+          <a:fillRef idx="1">
+            <a:schemeClr val="lt1"/>
+          </a:fillRef>
+          <a:effectRef idx="0">
+            <a:schemeClr val="dk1"/>
+          </a:effectRef>
+          <a:fontRef idx="minor">
+            <a:schemeClr val="dk1"/>
+          </a:fontRef>
+        </p:style>
+      </p:cxnSp>
+      <p:cxnSp>
+        <p:nvCxnSpPr>
+          <p:cNvPr id="306" name="Straight Arrow Connector 305"/>
+          <p:cNvCxnSpPr/>
+          <p:nvPr/>
+        </p:nvCxnSpPr>
+        <p:spPr>
+          <a:xfrm flipV="1">
+            <a:off x="8191455" y="1756643"/>
+            <a:ext cx="639998" cy="5756"/>
+          </a:xfrm>
+          <a:prstGeom prst="straightConnector1">
+            <a:avLst/>
+          </a:prstGeom>
+          <a:ln>
+            <a:tailEnd type="arrow"/>
+          </a:ln>
+        </p:spPr>
+        <p:style>
+          <a:lnRef idx="2">
+            <a:schemeClr val="dk1"/>
+          </a:lnRef>
+          <a:fillRef idx="1">
+            <a:schemeClr val="lt1"/>
+          </a:fillRef>
+          <a:effectRef idx="0">
+            <a:schemeClr val="dk1"/>
+          </a:effectRef>
+          <a:fontRef idx="minor">
+            <a:schemeClr val="dk1"/>
+          </a:fontRef>
+        </p:style>
+      </p:cxnSp>
+      <p:cxnSp>
+        <p:nvCxnSpPr>
+          <p:cNvPr id="307" name="Straight Arrow Connector 306"/>
+          <p:cNvCxnSpPr/>
+          <p:nvPr/>
+        </p:nvCxnSpPr>
+        <p:spPr>
+          <a:xfrm flipV="1">
+            <a:off x="8191455" y="3645540"/>
+            <a:ext cx="639998" cy="7746"/>
+          </a:xfrm>
+          <a:prstGeom prst="straightConnector1">
+            <a:avLst/>
+          </a:prstGeom>
+          <a:ln>
+            <a:tailEnd type="arrow"/>
+          </a:ln>
+        </p:spPr>
+        <p:style>
+          <a:lnRef idx="2">
+            <a:schemeClr val="dk1"/>
+          </a:lnRef>
+          <a:fillRef idx="1">
+            <a:schemeClr val="lt1"/>
+          </a:fillRef>
+          <a:effectRef idx="0">
+            <a:schemeClr val="dk1"/>
+          </a:effectRef>
+          <a:fontRef idx="minor">
+            <a:schemeClr val="dk1"/>
+          </a:fontRef>
+        </p:style>
+      </p:cxnSp>
+      <p:sp>
+        <p:nvSpPr>
+          <p:cNvPr id="312" name="Rounded Rectangle 311"/>
+          <p:cNvSpPr/>
+          <p:nvPr/>
+        </p:nvSpPr>
+        <p:spPr>
+          <a:xfrm>
+            <a:off x="-364651" y="4829059"/>
+            <a:ext cx="980220" cy="2017065"/>
+          </a:xfrm>
+          <a:prstGeom prst="roundRect">
+            <a:avLst/>
+          </a:prstGeom>
+        </p:spPr>
+        <p:style>
+          <a:lnRef idx="2">
+            <a:schemeClr val="accent1"/>
+          </a:lnRef>
+          <a:fillRef idx="1">
+            <a:schemeClr val="lt1"/>
+          </a:fillRef>
+          <a:effectRef idx="0">
+            <a:schemeClr val="accent1"/>
+          </a:effectRef>
+          <a:fontRef idx="minor">
+            <a:schemeClr val="dk1"/>
+          </a:fontRef>
+        </p:style>
+        <p:txBody>
+          <a:bodyPr rtlCol="0" anchor="ctr"/>
+          <a:lstStyle/>
+          <a:p>
+            <a:pPr algn="ctr"/>
+            <a:r>
+              <a:rPr lang="en-US" sz="1600" dirty="0" smtClean="0"/>
+              <a:t>Update </a:t>
+            </a:r>
+            <a:r>
+              <a:rPr lang="en-US" sz="1600" dirty="0" err="1" smtClean="0"/>
+              <a:t>Coords</a:t>
+            </a:r>
+            <a:endParaRPr lang="en-US" sz="1600" dirty="0" smtClean="0"/>
+          </a:p>
+          <a:p>
+            <a:pPr algn="ctr"/>
+            <a:r>
+              <a:rPr lang="en-US" sz="1600" dirty="0" smtClean="0"/>
+              <a:t>(flipped)</a:t>
+            </a:r>
+          </a:p>
+        </p:txBody>
+      </p:sp>
+      <p:cxnSp>
+        <p:nvCxnSpPr>
+          <p:cNvPr id="313" name="Straight Arrow Connector 312"/>
+          <p:cNvCxnSpPr/>
+          <p:nvPr/>
+        </p:nvCxnSpPr>
+        <p:spPr>
+          <a:xfrm>
+            <a:off x="-1060800" y="5835713"/>
+            <a:ext cx="696149" cy="5693"/>
+          </a:xfrm>
+          <a:prstGeom prst="straightConnector1">
+            <a:avLst/>
+          </a:prstGeom>
+          <a:ln>
+            <a:tailEnd type="arrow"/>
+          </a:ln>
+        </p:spPr>
+        <p:style>
+          <a:lnRef idx="2">
+            <a:schemeClr val="dk1"/>
+          </a:lnRef>
+          <a:fillRef idx="1">
+            <a:schemeClr val="lt1"/>
+          </a:fillRef>
+          <a:effectRef idx="0">
+            <a:schemeClr val="dk1"/>
+          </a:effectRef>
+          <a:fontRef idx="minor">
+            <a:schemeClr val="dk1"/>
+          </a:fontRef>
+        </p:style>
+      </p:cxnSp>
+      <p:cxnSp>
+        <p:nvCxnSpPr>
+          <p:cNvPr id="314" name="Straight Arrow Connector 313"/>
+          <p:cNvCxnSpPr/>
+          <p:nvPr/>
+        </p:nvCxnSpPr>
+        <p:spPr>
+          <a:xfrm flipV="1">
+            <a:off x="-1004649" y="4969903"/>
+            <a:ext cx="639998" cy="5756"/>
+          </a:xfrm>
+          <a:prstGeom prst="straightConnector1">
+            <a:avLst/>
+          </a:prstGeom>
+          <a:ln>
+            <a:tailEnd type="arrow"/>
+          </a:ln>
+        </p:spPr>
+        <p:style>
+          <a:lnRef idx="2">
+            <a:schemeClr val="dk1"/>
+          </a:lnRef>
+          <a:fillRef idx="1">
+            <a:schemeClr val="lt1"/>
+          </a:fillRef>
+          <a:effectRef idx="0">
+            <a:schemeClr val="dk1"/>
+          </a:effectRef>
+          <a:fontRef idx="minor">
+            <a:schemeClr val="dk1"/>
+          </a:fontRef>
+        </p:style>
+      </p:cxnSp>
+      <p:cxnSp>
+        <p:nvCxnSpPr>
+          <p:cNvPr id="315" name="Straight Arrow Connector 314"/>
+          <p:cNvCxnSpPr/>
+          <p:nvPr/>
+        </p:nvCxnSpPr>
+        <p:spPr>
+          <a:xfrm flipV="1">
+            <a:off x="-1006752" y="6721346"/>
+            <a:ext cx="639998" cy="7746"/>
+          </a:xfrm>
+          <a:prstGeom prst="straightConnector1">
+            <a:avLst/>
+          </a:prstGeom>
+          <a:ln>
+            <a:tailEnd type="arrow"/>
+          </a:ln>
+        </p:spPr>
+        <p:style>
+          <a:lnRef idx="2">
+            <a:schemeClr val="dk1"/>
+          </a:lnRef>
+          <a:fillRef idx="1">
+            <a:schemeClr val="lt1"/>
+          </a:fillRef>
+          <a:effectRef idx="0">
+            <a:schemeClr val="dk1"/>
+          </a:effectRef>
+          <a:fontRef idx="minor">
+            <a:schemeClr val="dk1"/>
+          </a:fontRef>
+        </p:style>
+      </p:cxnSp>
+      <p:sp>
+        <p:nvSpPr>
+          <p:cNvPr id="321" name="Rounded Rectangle 320"/>
+          <p:cNvSpPr/>
+          <p:nvPr/>
+        </p:nvSpPr>
+        <p:spPr>
+          <a:xfrm>
+            <a:off x="5308029" y="5461367"/>
+            <a:ext cx="1342325" cy="748691"/>
+          </a:xfrm>
+          <a:prstGeom prst="roundRect">
+            <a:avLst/>
+          </a:prstGeom>
+        </p:spPr>
+        <p:style>
+          <a:lnRef idx="2">
+            <a:schemeClr val="accent1"/>
+          </a:lnRef>
+          <a:fillRef idx="1">
+            <a:schemeClr val="lt1"/>
+          </a:fillRef>
+          <a:effectRef idx="0">
+            <a:schemeClr val="accent1"/>
+          </a:effectRef>
+          <a:fontRef idx="minor">
+            <a:schemeClr val="dk1"/>
+          </a:fontRef>
+        </p:style>
+        <p:txBody>
+          <a:bodyPr rtlCol="0" anchor="ctr"/>
+          <a:lstStyle/>
+          <a:p>
+            <a:pPr algn="ctr"/>
+            <a:r>
+              <a:rPr lang="en-US" sz="1600" dirty="0" smtClean="0"/>
+              <a:t>Coordinate transform</a:t>
+            </a:r>
+          </a:p>
+        </p:txBody>
+      </p:sp>
+      <p:sp>
+        <p:nvSpPr>
+          <p:cNvPr id="322" name="Rounded Rectangle 321"/>
+          <p:cNvSpPr/>
+          <p:nvPr/>
+        </p:nvSpPr>
+        <p:spPr>
+          <a:xfrm>
+            <a:off x="6957140" y="5455674"/>
+            <a:ext cx="1425149" cy="748691"/>
+          </a:xfrm>
+          <a:prstGeom prst="roundRect">
+            <a:avLst/>
+          </a:prstGeom>
+        </p:spPr>
+        <p:style>
+          <a:lnRef idx="2">
+            <a:schemeClr val="accent1"/>
+          </a:lnRef>
+          <a:fillRef idx="1">
+            <a:schemeClr val="lt1"/>
+          </a:fillRef>
+          <a:effectRef idx="0">
+            <a:schemeClr val="accent1"/>
+          </a:effectRef>
+          <a:fontRef idx="minor">
+            <a:schemeClr val="dk1"/>
+          </a:fontRef>
+        </p:style>
+        <p:txBody>
+          <a:bodyPr rtlCol="0" anchor="ctr"/>
+          <a:lstStyle/>
+          <a:p>
+            <a:pPr algn="ctr"/>
+            <a:r>
+              <a:rPr lang="en-US" sz="1600" dirty="0" smtClean="0"/>
+              <a:t>Aesthetics:</a:t>
+            </a:r>
+          </a:p>
+          <a:p>
+            <a:pPr algn="ctr"/>
+            <a:r>
+              <a:rPr lang="en-US" sz="1600" dirty="0" smtClean="0"/>
+              <a:t>Color/Texture</a:t>
+            </a:r>
+          </a:p>
+        </p:txBody>
+      </p:sp>
+      <p:sp>
+        <p:nvSpPr>
+          <p:cNvPr id="327" name="TextBox 326"/>
+          <p:cNvSpPr txBox="1"/>
+          <p:nvPr/>
+        </p:nvSpPr>
+        <p:spPr>
+          <a:xfrm>
+            <a:off x="8652547" y="5660743"/>
+            <a:ext cx="1168108" cy="338554"/>
+          </a:xfrm>
+          <a:prstGeom prst="rect">
+            <a:avLst/>
+          </a:prstGeom>
+        </p:spPr>
+        <p:style>
+          <a:lnRef idx="2">
+            <a:schemeClr val="dk1"/>
+          </a:lnRef>
+          <a:fillRef idx="1">
+            <a:schemeClr val="lt1"/>
+          </a:fillRef>
+          <a:effectRef idx="0">
+            <a:schemeClr val="dk1"/>
+          </a:effectRef>
+          <a:fontRef idx="minor">
+            <a:schemeClr val="dk1"/>
+          </a:fontRef>
+        </p:style>
+        <p:txBody>
+          <a:bodyPr wrap="none" rtlCol="0">
+            <a:spAutoFit/>
+          </a:bodyPr>
+          <a:lstStyle/>
+          <a:p>
+            <a:r>
+              <a:rPr lang="en-US" sz="1600" dirty="0" smtClean="0"/>
+              <a:t>SVG/canvas</a:t>
+            </a:r>
+            <a:endParaRPr lang="en-US" sz="1600" dirty="0"/>
+          </a:p>
+        </p:txBody>
+      </p:sp>
+      <p:cxnSp>
+        <p:nvCxnSpPr>
+          <p:cNvPr id="343" name="Straight Arrow Connector 342"/>
+          <p:cNvCxnSpPr>
+            <a:stCxn id="304" idx="3"/>
+            <a:endCxn id="321" idx="1"/>
+          </p:cNvCxnSpPr>
+          <p:nvPr/>
+        </p:nvCxnSpPr>
+        <p:spPr>
+          <a:xfrm flipV="1">
+            <a:off x="4884387" y="5835713"/>
+            <a:ext cx="423642" cy="3714"/>
+          </a:xfrm>
+          <a:prstGeom prst="straightConnector1">
+            <a:avLst/>
+          </a:prstGeom>
+          <a:ln>
+            <a:tailEnd type="arrow"/>
+          </a:ln>
+        </p:spPr>
+        <p:style>
+          <a:lnRef idx="2">
+            <a:schemeClr val="dk1"/>
+          </a:lnRef>
+          <a:fillRef idx="1">
+            <a:schemeClr val="lt1"/>
+          </a:fillRef>
+          <a:effectRef idx="0">
+            <a:schemeClr val="dk1"/>
+          </a:effectRef>
+          <a:fontRef idx="minor">
+            <a:schemeClr val="dk1"/>
+          </a:fontRef>
+        </p:style>
+      </p:cxnSp>
+      <p:cxnSp>
+        <p:nvCxnSpPr>
+          <p:cNvPr id="346" name="Straight Arrow Connector 345"/>
+          <p:cNvCxnSpPr/>
+          <p:nvPr/>
+        </p:nvCxnSpPr>
+        <p:spPr>
+          <a:xfrm flipV="1">
+            <a:off x="3379223" y="4975659"/>
+            <a:ext cx="639998" cy="5756"/>
+          </a:xfrm>
+          <a:prstGeom prst="straightConnector1">
+            <a:avLst/>
+          </a:prstGeom>
+          <a:ln>
+            <a:tailEnd type="arrow"/>
+          </a:ln>
+        </p:spPr>
+        <p:style>
+          <a:lnRef idx="2">
+            <a:schemeClr val="dk1"/>
+          </a:lnRef>
+          <a:fillRef idx="1">
+            <a:schemeClr val="lt1"/>
+          </a:fillRef>
+          <a:effectRef idx="0">
+            <a:schemeClr val="dk1"/>
+          </a:effectRef>
+          <a:fontRef idx="minor">
+            <a:schemeClr val="dk1"/>
+          </a:fontRef>
+        </p:style>
+      </p:cxnSp>
+      <p:cxnSp>
+        <p:nvCxnSpPr>
+          <p:cNvPr id="347" name="Straight Arrow Connector 346"/>
+          <p:cNvCxnSpPr/>
+          <p:nvPr/>
+        </p:nvCxnSpPr>
+        <p:spPr>
+          <a:xfrm flipV="1">
+            <a:off x="3377120" y="6727102"/>
+            <a:ext cx="639998" cy="7746"/>
+          </a:xfrm>
+          <a:prstGeom prst="straightConnector1">
+            <a:avLst/>
+          </a:prstGeom>
+          <a:ln>
+            <a:tailEnd type="arrow"/>
+          </a:ln>
+        </p:spPr>
+        <p:style>
+          <a:lnRef idx="2">
+            <a:schemeClr val="dk1"/>
+          </a:lnRef>
+          <a:fillRef idx="1">
+            <a:schemeClr val="lt1"/>
+          </a:fillRef>
+          <a:effectRef idx="0">
+            <a:schemeClr val="dk1"/>
+          </a:effectRef>
+          <a:fontRef idx="minor">
+            <a:schemeClr val="dk1"/>
+          </a:fontRef>
+        </p:style>
+      </p:cxnSp>
+      <p:cxnSp>
+        <p:nvCxnSpPr>
+          <p:cNvPr id="348" name="Straight Arrow Connector 347"/>
+          <p:cNvCxnSpPr/>
+          <p:nvPr/>
+        </p:nvCxnSpPr>
+        <p:spPr>
+          <a:xfrm flipV="1">
+            <a:off x="4892491" y="4981415"/>
+            <a:ext cx="639998" cy="5756"/>
+          </a:xfrm>
+          <a:prstGeom prst="straightConnector1">
+            <a:avLst/>
+          </a:prstGeom>
+          <a:ln>
+            <a:tailEnd type="arrow"/>
+          </a:ln>
+        </p:spPr>
+        <p:style>
+          <a:lnRef idx="2">
+            <a:schemeClr val="dk1"/>
+          </a:lnRef>
+          <a:fillRef idx="1">
+            <a:schemeClr val="lt1"/>
+          </a:fillRef>
+          <a:effectRef idx="0">
+            <a:schemeClr val="dk1"/>
+          </a:effectRef>
+          <a:fontRef idx="minor">
+            <a:schemeClr val="dk1"/>
+          </a:fontRef>
+        </p:style>
+      </p:cxnSp>
+      <p:cxnSp>
+        <p:nvCxnSpPr>
+          <p:cNvPr id="349" name="Straight Arrow Connector 348"/>
+          <p:cNvCxnSpPr/>
+          <p:nvPr/>
+        </p:nvCxnSpPr>
+        <p:spPr>
+          <a:xfrm flipV="1">
+            <a:off x="4890388" y="6732858"/>
+            <a:ext cx="639998" cy="7746"/>
+          </a:xfrm>
+          <a:prstGeom prst="straightConnector1">
+            <a:avLst/>
+          </a:prstGeom>
+          <a:ln>
+            <a:tailEnd type="arrow"/>
+          </a:ln>
+        </p:spPr>
+        <p:style>
+          <a:lnRef idx="2">
+            <a:schemeClr val="dk1"/>
+          </a:lnRef>
+          <a:fillRef idx="1">
+            <a:schemeClr val="lt1"/>
+          </a:fillRef>
+          <a:effectRef idx="0">
+            <a:schemeClr val="dk1"/>
+          </a:effectRef>
+          <a:fontRef idx="minor">
+            <a:schemeClr val="dk1"/>
+          </a:fontRef>
+        </p:style>
+      </p:cxnSp>
     </p:spTree>
     <p:extLst>
       <p:ext uri="{BB962C8B-B14F-4D97-AF65-F5344CB8AC3E}">
         <p14:creationId xmlns:p14="http://schemas.microsoft.com/office/powerpoint/2010/main" val="1649514263"/>
+      </p:ext>
+    </p:extLst>
+  </p:cSld>
+  <p:clrMapOvr>
+    <a:masterClrMapping/>
+  </p:clrMapOvr>
+</p:sld>
+</file>
+
+<file path=ppt/slides/slide2.xml><?xml version="1.0" encoding="utf-8"?>
+<p:sld xmlns:a="http://schemas.openxmlformats.org/drawingml/2006/main" xmlns:r="http://schemas.openxmlformats.org/officeDocument/2006/relationships" xmlns:p="http://schemas.openxmlformats.org/presentationml/2006/main">
+  <p:cSld>
+    <p:spTree>
+      <p:nvGrpSpPr>
+        <p:cNvPr id="1" name=""/>
+        <p:cNvGrpSpPr/>
+        <p:nvPr/>
+      </p:nvGrpSpPr>
+      <p:grpSpPr>
+        <a:xfrm>
+          <a:off x="0" y="0"/>
+          <a:ext cx="0" cy="0"/>
+          <a:chOff x="0" y="0"/>
+          <a:chExt cx="0" cy="0"/>
+        </a:xfrm>
+      </p:grpSpPr>
+      <p:sp>
+        <p:nvSpPr>
+          <p:cNvPr id="4" name="Rounded Rectangle 3"/>
+          <p:cNvSpPr/>
+          <p:nvPr/>
+        </p:nvSpPr>
+        <p:spPr>
+          <a:xfrm>
+            <a:off x="563815" y="2371314"/>
+            <a:ext cx="1039118" cy="510427"/>
+          </a:xfrm>
+          <a:prstGeom prst="roundRect">
+            <a:avLst/>
+          </a:prstGeom>
+        </p:spPr>
+        <p:style>
+          <a:lnRef idx="2">
+            <a:schemeClr val="dk1"/>
+          </a:lnRef>
+          <a:fillRef idx="1">
+            <a:schemeClr val="lt1"/>
+          </a:fillRef>
+          <a:effectRef idx="0">
+            <a:schemeClr val="dk1"/>
+          </a:effectRef>
+          <a:fontRef idx="minor">
+            <a:schemeClr val="dk1"/>
+          </a:fontRef>
+        </p:style>
+        <p:txBody>
+          <a:bodyPr rtlCol="0" anchor="ctr"/>
+          <a:lstStyle/>
+          <a:p>
+            <a:pPr algn="ctr"/>
+            <a:r>
+              <a:rPr lang="en-US" sz="1600" dirty="0" smtClean="0"/>
+              <a:t>Split</a:t>
+            </a:r>
+            <a:endParaRPr lang="en-US" sz="1600" dirty="0"/>
+          </a:p>
+        </p:txBody>
+      </p:sp>
+      <p:cxnSp>
+        <p:nvCxnSpPr>
+          <p:cNvPr id="5" name="Straight Arrow Connector 4"/>
+          <p:cNvCxnSpPr>
+            <a:stCxn id="4" idx="3"/>
+            <a:endCxn id="33" idx="1"/>
+          </p:cNvCxnSpPr>
+          <p:nvPr/>
+        </p:nvCxnSpPr>
+        <p:spPr>
+          <a:xfrm flipV="1">
+            <a:off x="1602933" y="2008623"/>
+            <a:ext cx="1072437" cy="617905"/>
+          </a:xfrm>
+          <a:prstGeom prst="straightConnector1">
+            <a:avLst/>
+          </a:prstGeom>
+          <a:ln>
+            <a:tailEnd type="arrow"/>
+          </a:ln>
+        </p:spPr>
+        <p:style>
+          <a:lnRef idx="2">
+            <a:schemeClr val="dk1"/>
+          </a:lnRef>
+          <a:fillRef idx="0">
+            <a:schemeClr val="dk1"/>
+          </a:fillRef>
+          <a:effectRef idx="1">
+            <a:schemeClr val="dk1"/>
+          </a:effectRef>
+          <a:fontRef idx="minor">
+            <a:schemeClr val="tx1"/>
+          </a:fontRef>
+        </p:style>
+      </p:cxnSp>
+      <p:cxnSp>
+        <p:nvCxnSpPr>
+          <p:cNvPr id="6" name="Straight Arrow Connector 5"/>
+          <p:cNvCxnSpPr>
+            <a:stCxn id="4" idx="3"/>
+            <a:endCxn id="8" idx="1"/>
+          </p:cNvCxnSpPr>
+          <p:nvPr/>
+        </p:nvCxnSpPr>
+        <p:spPr>
+          <a:xfrm>
+            <a:off x="1602933" y="2626528"/>
+            <a:ext cx="1084711" cy="1110"/>
+          </a:xfrm>
+          <a:prstGeom prst="straightConnector1">
+            <a:avLst/>
+          </a:prstGeom>
+          <a:ln>
+            <a:tailEnd type="arrow"/>
+          </a:ln>
+        </p:spPr>
+        <p:style>
+          <a:lnRef idx="2">
+            <a:schemeClr val="dk1"/>
+          </a:lnRef>
+          <a:fillRef idx="0">
+            <a:schemeClr val="dk1"/>
+          </a:fillRef>
+          <a:effectRef idx="1">
+            <a:schemeClr val="dk1"/>
+          </a:effectRef>
+          <a:fontRef idx="minor">
+            <a:schemeClr val="tx1"/>
+          </a:fontRef>
+        </p:style>
+      </p:cxnSp>
+      <p:cxnSp>
+        <p:nvCxnSpPr>
+          <p:cNvPr id="7" name="Straight Arrow Connector 6"/>
+          <p:cNvCxnSpPr>
+            <a:stCxn id="4" idx="3"/>
+            <a:endCxn id="40" idx="1"/>
+          </p:cNvCxnSpPr>
+          <p:nvPr/>
+        </p:nvCxnSpPr>
+        <p:spPr>
+          <a:xfrm>
+            <a:off x="1602933" y="2626528"/>
+            <a:ext cx="1084711" cy="623893"/>
+          </a:xfrm>
+          <a:prstGeom prst="straightConnector1">
+            <a:avLst/>
+          </a:prstGeom>
+          <a:ln>
+            <a:tailEnd type="arrow"/>
+          </a:ln>
+        </p:spPr>
+        <p:style>
+          <a:lnRef idx="2">
+            <a:schemeClr val="dk1"/>
+          </a:lnRef>
+          <a:fillRef idx="0">
+            <a:schemeClr val="dk1"/>
+          </a:fillRef>
+          <a:effectRef idx="1">
+            <a:schemeClr val="dk1"/>
+          </a:effectRef>
+          <a:fontRef idx="minor">
+            <a:schemeClr val="tx1"/>
+          </a:fontRef>
+        </p:style>
+      </p:cxnSp>
+      <p:sp>
+        <p:nvSpPr>
+          <p:cNvPr id="8" name="Rounded Rectangle 7"/>
+          <p:cNvSpPr/>
+          <p:nvPr/>
+        </p:nvSpPr>
+        <p:spPr>
+          <a:xfrm>
+            <a:off x="2687644" y="2372425"/>
+            <a:ext cx="523780" cy="510426"/>
+          </a:xfrm>
+          <a:prstGeom prst="roundRect">
+            <a:avLst/>
+          </a:prstGeom>
+        </p:spPr>
+        <p:style>
+          <a:lnRef idx="2">
+            <a:schemeClr val="accent1"/>
+          </a:lnRef>
+          <a:fillRef idx="1">
+            <a:schemeClr val="lt1"/>
+          </a:fillRef>
+          <a:effectRef idx="0">
+            <a:schemeClr val="accent1"/>
+          </a:effectRef>
+          <a:fontRef idx="minor">
+            <a:schemeClr val="dk1"/>
+          </a:fontRef>
+        </p:style>
+        <p:txBody>
+          <a:bodyPr rtlCol="0" anchor="ctr"/>
+          <a:lstStyle/>
+          <a:p>
+            <a:pPr algn="ctr"/>
+            <a:endParaRPr lang="en-US" sz="1600" dirty="0"/>
+          </a:p>
+        </p:txBody>
+      </p:sp>
+      <p:cxnSp>
+        <p:nvCxnSpPr>
+          <p:cNvPr id="17" name="Straight Arrow Connector 16"/>
+          <p:cNvCxnSpPr>
+            <a:stCxn id="8" idx="3"/>
+          </p:cNvCxnSpPr>
+          <p:nvPr/>
+        </p:nvCxnSpPr>
+        <p:spPr>
+          <a:xfrm>
+            <a:off x="3211424" y="2627638"/>
+            <a:ext cx="482839" cy="0"/>
+          </a:xfrm>
+          <a:prstGeom prst="straightConnector1">
+            <a:avLst/>
+          </a:prstGeom>
+          <a:ln>
+            <a:tailEnd type="arrow"/>
+          </a:ln>
+        </p:spPr>
+        <p:style>
+          <a:lnRef idx="2">
+            <a:schemeClr val="accent1"/>
+          </a:lnRef>
+          <a:fillRef idx="1">
+            <a:schemeClr val="lt1"/>
+          </a:fillRef>
+          <a:effectRef idx="0">
+            <a:schemeClr val="accent1"/>
+          </a:effectRef>
+          <a:fontRef idx="minor">
+            <a:schemeClr val="dk1"/>
+          </a:fontRef>
+        </p:style>
+      </p:cxnSp>
+      <p:sp>
+        <p:nvSpPr>
+          <p:cNvPr id="19" name="Rounded Rectangle 18"/>
+          <p:cNvSpPr/>
+          <p:nvPr/>
+        </p:nvSpPr>
+        <p:spPr>
+          <a:xfrm>
+            <a:off x="4693380" y="2371315"/>
+            <a:ext cx="573853" cy="510426"/>
+          </a:xfrm>
+          <a:prstGeom prst="roundRect">
+            <a:avLst/>
+          </a:prstGeom>
+        </p:spPr>
+        <p:style>
+          <a:lnRef idx="2">
+            <a:schemeClr val="accent1"/>
+          </a:lnRef>
+          <a:fillRef idx="1">
+            <a:schemeClr val="lt1"/>
+          </a:fillRef>
+          <a:effectRef idx="0">
+            <a:schemeClr val="accent1"/>
+          </a:effectRef>
+          <a:fontRef idx="minor">
+            <a:schemeClr val="dk1"/>
+          </a:fontRef>
+        </p:style>
+        <p:txBody>
+          <a:bodyPr rtlCol="0" anchor="ctr"/>
+          <a:lstStyle/>
+          <a:p>
+            <a:pPr algn="ctr"/>
+            <a:endParaRPr lang="en-US" sz="1600" dirty="0" smtClean="0"/>
+          </a:p>
+        </p:txBody>
+      </p:sp>
+      <p:cxnSp>
+        <p:nvCxnSpPr>
+          <p:cNvPr id="20" name="Straight Arrow Connector 19"/>
+          <p:cNvCxnSpPr>
+            <a:endCxn id="19" idx="1"/>
+          </p:cNvCxnSpPr>
+          <p:nvPr/>
+        </p:nvCxnSpPr>
+        <p:spPr>
+          <a:xfrm>
+            <a:off x="4210541" y="2626528"/>
+            <a:ext cx="482839" cy="0"/>
+          </a:xfrm>
+          <a:prstGeom prst="straightConnector1">
+            <a:avLst/>
+          </a:prstGeom>
+          <a:ln>
+            <a:tailEnd type="arrow"/>
+          </a:ln>
+        </p:spPr>
+        <p:style>
+          <a:lnRef idx="2">
+            <a:schemeClr val="accent1"/>
+          </a:lnRef>
+          <a:fillRef idx="1">
+            <a:schemeClr val="lt1"/>
+          </a:fillRef>
+          <a:effectRef idx="0">
+            <a:schemeClr val="accent1"/>
+          </a:effectRef>
+          <a:fontRef idx="minor">
+            <a:schemeClr val="dk1"/>
+          </a:fontRef>
+        </p:style>
+      </p:cxnSp>
+      <p:sp>
+        <p:nvSpPr>
+          <p:cNvPr id="21" name="TextBox 20"/>
+          <p:cNvSpPr txBox="1"/>
+          <p:nvPr/>
+        </p:nvSpPr>
+        <p:spPr>
+          <a:xfrm>
+            <a:off x="3778942" y="2363112"/>
+            <a:ext cx="344039" cy="369332"/>
+          </a:xfrm>
+          <a:prstGeom prst="rect">
+            <a:avLst/>
+          </a:prstGeom>
+          <a:ln>
+            <a:noFill/>
+          </a:ln>
+        </p:spPr>
+        <p:style>
+          <a:lnRef idx="2">
+            <a:schemeClr val="accent1"/>
+          </a:lnRef>
+          <a:fillRef idx="1">
+            <a:schemeClr val="lt1"/>
+          </a:fillRef>
+          <a:effectRef idx="0">
+            <a:schemeClr val="accent1"/>
+          </a:effectRef>
+          <a:fontRef idx="minor">
+            <a:schemeClr val="dk1"/>
+          </a:fontRef>
+        </p:style>
+        <p:txBody>
+          <a:bodyPr wrap="none" rtlCol="0">
+            <a:spAutoFit/>
+          </a:bodyPr>
+          <a:lstStyle/>
+          <a:p>
+            <a:r>
+              <a:rPr lang="en-US" dirty="0" smtClean="0"/>
+              <a:t>…</a:t>
+            </a:r>
+            <a:endParaRPr lang="en-US" dirty="0"/>
+          </a:p>
+        </p:txBody>
+      </p:sp>
+      <p:sp>
+        <p:nvSpPr>
+          <p:cNvPr id="22" name="Rounded Rectangle 21"/>
+          <p:cNvSpPr/>
+          <p:nvPr/>
+        </p:nvSpPr>
+        <p:spPr>
+          <a:xfrm>
+            <a:off x="563815" y="274653"/>
+            <a:ext cx="1039118" cy="509316"/>
+          </a:xfrm>
+          <a:prstGeom prst="roundRect">
+            <a:avLst/>
+          </a:prstGeom>
+        </p:spPr>
+        <p:style>
+          <a:lnRef idx="2">
+            <a:schemeClr val="dk1"/>
+          </a:lnRef>
+          <a:fillRef idx="1">
+            <a:schemeClr val="lt1"/>
+          </a:fillRef>
+          <a:effectRef idx="0">
+            <a:schemeClr val="dk1"/>
+          </a:effectRef>
+          <a:fontRef idx="minor">
+            <a:schemeClr val="dk1"/>
+          </a:fontRef>
+        </p:style>
+        <p:txBody>
+          <a:bodyPr rtlCol="0" anchor="ctr"/>
+          <a:lstStyle/>
+          <a:p>
+            <a:pPr algn="ctr"/>
+            <a:r>
+              <a:rPr lang="en-US" sz="1600" dirty="0" smtClean="0"/>
+              <a:t>Split</a:t>
+            </a:r>
+            <a:endParaRPr lang="en-US" sz="1600" dirty="0"/>
+          </a:p>
+        </p:txBody>
+      </p:sp>
+      <p:cxnSp>
+        <p:nvCxnSpPr>
+          <p:cNvPr id="24" name="Straight Arrow Connector 23"/>
+          <p:cNvCxnSpPr>
+            <a:stCxn id="22" idx="3"/>
+            <a:endCxn id="26" idx="1"/>
+          </p:cNvCxnSpPr>
+          <p:nvPr/>
+        </p:nvCxnSpPr>
+        <p:spPr>
+          <a:xfrm>
+            <a:off x="1602933" y="529311"/>
+            <a:ext cx="1084711" cy="554"/>
+          </a:xfrm>
+          <a:prstGeom prst="straightConnector1">
+            <a:avLst/>
+          </a:prstGeom>
+          <a:ln>
+            <a:tailEnd type="arrow"/>
+          </a:ln>
+        </p:spPr>
+        <p:style>
+          <a:lnRef idx="2">
+            <a:schemeClr val="dk1"/>
+          </a:lnRef>
+          <a:fillRef idx="0">
+            <a:schemeClr val="dk1"/>
+          </a:fillRef>
+          <a:effectRef idx="1">
+            <a:schemeClr val="dk1"/>
+          </a:effectRef>
+          <a:fontRef idx="minor">
+            <a:schemeClr val="tx1"/>
+          </a:fontRef>
+        </p:style>
+      </p:cxnSp>
+      <p:sp>
+        <p:nvSpPr>
+          <p:cNvPr id="26" name="Rounded Rectangle 25"/>
+          <p:cNvSpPr/>
+          <p:nvPr/>
+        </p:nvSpPr>
+        <p:spPr>
+          <a:xfrm>
+            <a:off x="2687644" y="274652"/>
+            <a:ext cx="523780" cy="510426"/>
+          </a:xfrm>
+          <a:prstGeom prst="roundRect">
+            <a:avLst/>
+          </a:prstGeom>
+        </p:spPr>
+        <p:style>
+          <a:lnRef idx="2">
+            <a:schemeClr val="accent1"/>
+          </a:lnRef>
+          <a:fillRef idx="1">
+            <a:schemeClr val="lt1"/>
+          </a:fillRef>
+          <a:effectRef idx="0">
+            <a:schemeClr val="accent1"/>
+          </a:effectRef>
+          <a:fontRef idx="minor">
+            <a:schemeClr val="dk1"/>
+          </a:fontRef>
+        </p:style>
+        <p:txBody>
+          <a:bodyPr rtlCol="0" anchor="ctr"/>
+          <a:lstStyle/>
+          <a:p>
+            <a:pPr algn="ctr"/>
+            <a:endParaRPr lang="en-US" sz="1600" dirty="0"/>
+          </a:p>
+        </p:txBody>
+      </p:sp>
+      <p:cxnSp>
+        <p:nvCxnSpPr>
+          <p:cNvPr id="28" name="Straight Arrow Connector 27"/>
+          <p:cNvCxnSpPr>
+            <a:stCxn id="26" idx="3"/>
+          </p:cNvCxnSpPr>
+          <p:nvPr/>
+        </p:nvCxnSpPr>
+        <p:spPr>
+          <a:xfrm>
+            <a:off x="3211424" y="529865"/>
+            <a:ext cx="482839" cy="0"/>
+          </a:xfrm>
+          <a:prstGeom prst="straightConnector1">
+            <a:avLst/>
+          </a:prstGeom>
+          <a:ln>
+            <a:tailEnd type="arrow"/>
+          </a:ln>
+        </p:spPr>
+        <p:style>
+          <a:lnRef idx="2">
+            <a:schemeClr val="accent1"/>
+          </a:lnRef>
+          <a:fillRef idx="1">
+            <a:schemeClr val="lt1"/>
+          </a:fillRef>
+          <a:effectRef idx="0">
+            <a:schemeClr val="accent1"/>
+          </a:effectRef>
+          <a:fontRef idx="minor">
+            <a:schemeClr val="dk1"/>
+          </a:fontRef>
+        </p:style>
+      </p:cxnSp>
+      <p:sp>
+        <p:nvSpPr>
+          <p:cNvPr id="30" name="Rounded Rectangle 29"/>
+          <p:cNvSpPr/>
+          <p:nvPr/>
+        </p:nvSpPr>
+        <p:spPr>
+          <a:xfrm>
+            <a:off x="4693380" y="273542"/>
+            <a:ext cx="573853" cy="510426"/>
+          </a:xfrm>
+          <a:prstGeom prst="roundRect">
+            <a:avLst/>
+          </a:prstGeom>
+        </p:spPr>
+        <p:style>
+          <a:lnRef idx="2">
+            <a:schemeClr val="accent1"/>
+          </a:lnRef>
+          <a:fillRef idx="1">
+            <a:schemeClr val="lt1"/>
+          </a:fillRef>
+          <a:effectRef idx="0">
+            <a:schemeClr val="accent1"/>
+          </a:effectRef>
+          <a:fontRef idx="minor">
+            <a:schemeClr val="dk1"/>
+          </a:fontRef>
+        </p:style>
+        <p:txBody>
+          <a:bodyPr rtlCol="0" anchor="ctr"/>
+          <a:lstStyle/>
+          <a:p>
+            <a:pPr algn="ctr"/>
+            <a:endParaRPr lang="en-US" sz="1600" dirty="0" smtClean="0"/>
+          </a:p>
+        </p:txBody>
+      </p:sp>
+      <p:cxnSp>
+        <p:nvCxnSpPr>
+          <p:cNvPr id="31" name="Straight Arrow Connector 30"/>
+          <p:cNvCxnSpPr>
+            <a:endCxn id="30" idx="1"/>
+          </p:cNvCxnSpPr>
+          <p:nvPr/>
+        </p:nvCxnSpPr>
+        <p:spPr>
+          <a:xfrm>
+            <a:off x="4210541" y="528755"/>
+            <a:ext cx="482839" cy="0"/>
+          </a:xfrm>
+          <a:prstGeom prst="straightConnector1">
+            <a:avLst/>
+          </a:prstGeom>
+          <a:ln>
+            <a:tailEnd type="arrow"/>
+          </a:ln>
+        </p:spPr>
+        <p:style>
+          <a:lnRef idx="2">
+            <a:schemeClr val="accent1"/>
+          </a:lnRef>
+          <a:fillRef idx="1">
+            <a:schemeClr val="lt1"/>
+          </a:fillRef>
+          <a:effectRef idx="0">
+            <a:schemeClr val="accent1"/>
+          </a:effectRef>
+          <a:fontRef idx="minor">
+            <a:schemeClr val="dk1"/>
+          </a:fontRef>
+        </p:style>
+      </p:cxnSp>
+      <p:sp>
+        <p:nvSpPr>
+          <p:cNvPr id="32" name="TextBox 31"/>
+          <p:cNvSpPr txBox="1"/>
+          <p:nvPr/>
+        </p:nvSpPr>
+        <p:spPr>
+          <a:xfrm>
+            <a:off x="3778942" y="265339"/>
+            <a:ext cx="344039" cy="369332"/>
+          </a:xfrm>
+          <a:prstGeom prst="rect">
+            <a:avLst/>
+          </a:prstGeom>
+          <a:ln>
+            <a:noFill/>
+          </a:ln>
+        </p:spPr>
+        <p:style>
+          <a:lnRef idx="2">
+            <a:schemeClr val="accent1"/>
+          </a:lnRef>
+          <a:fillRef idx="1">
+            <a:schemeClr val="lt1"/>
+          </a:fillRef>
+          <a:effectRef idx="0">
+            <a:schemeClr val="accent1"/>
+          </a:effectRef>
+          <a:fontRef idx="minor">
+            <a:schemeClr val="dk1"/>
+          </a:fontRef>
+        </p:style>
+        <p:txBody>
+          <a:bodyPr wrap="none" rtlCol="0">
+            <a:spAutoFit/>
+          </a:bodyPr>
+          <a:lstStyle/>
+          <a:p>
+            <a:r>
+              <a:rPr lang="en-US" dirty="0" smtClean="0"/>
+              <a:t>…</a:t>
+            </a:r>
+            <a:endParaRPr lang="en-US" dirty="0"/>
+          </a:p>
+        </p:txBody>
+      </p:sp>
+      <p:sp>
+        <p:nvSpPr>
+          <p:cNvPr id="33" name="Rounded Rectangle 32"/>
+          <p:cNvSpPr/>
+          <p:nvPr/>
+        </p:nvSpPr>
+        <p:spPr>
+          <a:xfrm>
+            <a:off x="2675370" y="1753410"/>
+            <a:ext cx="523780" cy="510426"/>
+          </a:xfrm>
+          <a:prstGeom prst="roundRect">
+            <a:avLst/>
+          </a:prstGeom>
+        </p:spPr>
+        <p:style>
+          <a:lnRef idx="2">
+            <a:schemeClr val="accent1"/>
+          </a:lnRef>
+          <a:fillRef idx="1">
+            <a:schemeClr val="lt1"/>
+          </a:fillRef>
+          <a:effectRef idx="0">
+            <a:schemeClr val="accent1"/>
+          </a:effectRef>
+          <a:fontRef idx="minor">
+            <a:schemeClr val="dk1"/>
+          </a:fontRef>
+        </p:style>
+        <p:txBody>
+          <a:bodyPr rtlCol="0" anchor="ctr"/>
+          <a:lstStyle/>
+          <a:p>
+            <a:pPr algn="ctr"/>
+            <a:endParaRPr lang="en-US" sz="1600" dirty="0"/>
+          </a:p>
+        </p:txBody>
+      </p:sp>
+      <p:cxnSp>
+        <p:nvCxnSpPr>
+          <p:cNvPr id="35" name="Straight Arrow Connector 34"/>
+          <p:cNvCxnSpPr>
+            <a:stCxn id="33" idx="3"/>
+          </p:cNvCxnSpPr>
+          <p:nvPr/>
+        </p:nvCxnSpPr>
+        <p:spPr>
+          <a:xfrm>
+            <a:off x="3199150" y="2008623"/>
+            <a:ext cx="482839" cy="0"/>
+          </a:xfrm>
+          <a:prstGeom prst="straightConnector1">
+            <a:avLst/>
+          </a:prstGeom>
+          <a:ln>
+            <a:tailEnd type="arrow"/>
+          </a:ln>
+        </p:spPr>
+        <p:style>
+          <a:lnRef idx="2">
+            <a:schemeClr val="accent1"/>
+          </a:lnRef>
+          <a:fillRef idx="1">
+            <a:schemeClr val="lt1"/>
+          </a:fillRef>
+          <a:effectRef idx="0">
+            <a:schemeClr val="accent1"/>
+          </a:effectRef>
+          <a:fontRef idx="minor">
+            <a:schemeClr val="dk1"/>
+          </a:fontRef>
+        </p:style>
+      </p:cxnSp>
+      <p:sp>
+        <p:nvSpPr>
+          <p:cNvPr id="37" name="Rounded Rectangle 36"/>
+          <p:cNvSpPr/>
+          <p:nvPr/>
+        </p:nvSpPr>
+        <p:spPr>
+          <a:xfrm>
+            <a:off x="4681106" y="1752300"/>
+            <a:ext cx="573853" cy="510426"/>
+          </a:xfrm>
+          <a:prstGeom prst="roundRect">
+            <a:avLst/>
+          </a:prstGeom>
+        </p:spPr>
+        <p:style>
+          <a:lnRef idx="2">
+            <a:schemeClr val="accent1"/>
+          </a:lnRef>
+          <a:fillRef idx="1">
+            <a:schemeClr val="lt1"/>
+          </a:fillRef>
+          <a:effectRef idx="0">
+            <a:schemeClr val="accent1"/>
+          </a:effectRef>
+          <a:fontRef idx="minor">
+            <a:schemeClr val="dk1"/>
+          </a:fontRef>
+        </p:style>
+        <p:txBody>
+          <a:bodyPr rtlCol="0" anchor="ctr"/>
+          <a:lstStyle/>
+          <a:p>
+            <a:pPr algn="ctr"/>
+            <a:endParaRPr lang="en-US" sz="1600" dirty="0" smtClean="0"/>
+          </a:p>
+        </p:txBody>
+      </p:sp>
+      <p:cxnSp>
+        <p:nvCxnSpPr>
+          <p:cNvPr id="38" name="Straight Arrow Connector 37"/>
+          <p:cNvCxnSpPr>
+            <a:endCxn id="37" idx="1"/>
+          </p:cNvCxnSpPr>
+          <p:nvPr/>
+        </p:nvCxnSpPr>
+        <p:spPr>
+          <a:xfrm>
+            <a:off x="4198267" y="2007513"/>
+            <a:ext cx="482839" cy="0"/>
+          </a:xfrm>
+          <a:prstGeom prst="straightConnector1">
+            <a:avLst/>
+          </a:prstGeom>
+          <a:ln>
+            <a:tailEnd type="arrow"/>
+          </a:ln>
+        </p:spPr>
+        <p:style>
+          <a:lnRef idx="2">
+            <a:schemeClr val="accent1"/>
+          </a:lnRef>
+          <a:fillRef idx="1">
+            <a:schemeClr val="lt1"/>
+          </a:fillRef>
+          <a:effectRef idx="0">
+            <a:schemeClr val="accent1"/>
+          </a:effectRef>
+          <a:fontRef idx="minor">
+            <a:schemeClr val="dk1"/>
+          </a:fontRef>
+        </p:style>
+      </p:cxnSp>
+      <p:sp>
+        <p:nvSpPr>
+          <p:cNvPr id="39" name="TextBox 38"/>
+          <p:cNvSpPr txBox="1"/>
+          <p:nvPr/>
+        </p:nvSpPr>
+        <p:spPr>
+          <a:xfrm>
+            <a:off x="3766668" y="1744097"/>
+            <a:ext cx="344039" cy="369332"/>
+          </a:xfrm>
+          <a:prstGeom prst="rect">
+            <a:avLst/>
+          </a:prstGeom>
+          <a:ln>
+            <a:noFill/>
+          </a:ln>
+        </p:spPr>
+        <p:style>
+          <a:lnRef idx="2">
+            <a:schemeClr val="accent1"/>
+          </a:lnRef>
+          <a:fillRef idx="1">
+            <a:schemeClr val="lt1"/>
+          </a:fillRef>
+          <a:effectRef idx="0">
+            <a:schemeClr val="accent1"/>
+          </a:effectRef>
+          <a:fontRef idx="minor">
+            <a:schemeClr val="dk1"/>
+          </a:fontRef>
+        </p:style>
+        <p:txBody>
+          <a:bodyPr wrap="none" rtlCol="0">
+            <a:spAutoFit/>
+          </a:bodyPr>
+          <a:lstStyle/>
+          <a:p>
+            <a:r>
+              <a:rPr lang="en-US" dirty="0" smtClean="0"/>
+              <a:t>…</a:t>
+            </a:r>
+            <a:endParaRPr lang="en-US" dirty="0"/>
+          </a:p>
+        </p:txBody>
+      </p:sp>
+      <p:sp>
+        <p:nvSpPr>
+          <p:cNvPr id="40" name="Rounded Rectangle 39"/>
+          <p:cNvSpPr/>
+          <p:nvPr/>
+        </p:nvSpPr>
+        <p:spPr>
+          <a:xfrm>
+            <a:off x="2687644" y="2995208"/>
+            <a:ext cx="523780" cy="510426"/>
+          </a:xfrm>
+          <a:prstGeom prst="roundRect">
+            <a:avLst/>
+          </a:prstGeom>
+        </p:spPr>
+        <p:style>
+          <a:lnRef idx="2">
+            <a:schemeClr val="accent1"/>
+          </a:lnRef>
+          <a:fillRef idx="1">
+            <a:schemeClr val="lt1"/>
+          </a:fillRef>
+          <a:effectRef idx="0">
+            <a:schemeClr val="accent1"/>
+          </a:effectRef>
+          <a:fontRef idx="minor">
+            <a:schemeClr val="dk1"/>
+          </a:fontRef>
+        </p:style>
+        <p:txBody>
+          <a:bodyPr rtlCol="0" anchor="ctr"/>
+          <a:lstStyle/>
+          <a:p>
+            <a:pPr algn="ctr"/>
+            <a:endParaRPr lang="en-US" sz="1600" dirty="0"/>
+          </a:p>
+        </p:txBody>
+      </p:sp>
+      <p:cxnSp>
+        <p:nvCxnSpPr>
+          <p:cNvPr id="42" name="Straight Arrow Connector 41"/>
+          <p:cNvCxnSpPr>
+            <a:stCxn id="40" idx="3"/>
+          </p:cNvCxnSpPr>
+          <p:nvPr/>
+        </p:nvCxnSpPr>
+        <p:spPr>
+          <a:xfrm>
+            <a:off x="3211424" y="3250421"/>
+            <a:ext cx="482839" cy="0"/>
+          </a:xfrm>
+          <a:prstGeom prst="straightConnector1">
+            <a:avLst/>
+          </a:prstGeom>
+          <a:ln>
+            <a:tailEnd type="arrow"/>
+          </a:ln>
+        </p:spPr>
+        <p:style>
+          <a:lnRef idx="2">
+            <a:schemeClr val="accent1"/>
+          </a:lnRef>
+          <a:fillRef idx="1">
+            <a:schemeClr val="lt1"/>
+          </a:fillRef>
+          <a:effectRef idx="0">
+            <a:schemeClr val="accent1"/>
+          </a:effectRef>
+          <a:fontRef idx="minor">
+            <a:schemeClr val="dk1"/>
+          </a:fontRef>
+        </p:style>
+      </p:cxnSp>
+      <p:sp>
+        <p:nvSpPr>
+          <p:cNvPr id="44" name="Rounded Rectangle 43"/>
+          <p:cNvSpPr/>
+          <p:nvPr/>
+        </p:nvSpPr>
+        <p:spPr>
+          <a:xfrm>
+            <a:off x="4693380" y="2994098"/>
+            <a:ext cx="573853" cy="510426"/>
+          </a:xfrm>
+          <a:prstGeom prst="roundRect">
+            <a:avLst/>
+          </a:prstGeom>
+        </p:spPr>
+        <p:style>
+          <a:lnRef idx="2">
+            <a:schemeClr val="accent1"/>
+          </a:lnRef>
+          <a:fillRef idx="1">
+            <a:schemeClr val="lt1"/>
+          </a:fillRef>
+          <a:effectRef idx="0">
+            <a:schemeClr val="accent1"/>
+          </a:effectRef>
+          <a:fontRef idx="minor">
+            <a:schemeClr val="dk1"/>
+          </a:fontRef>
+        </p:style>
+        <p:txBody>
+          <a:bodyPr rtlCol="0" anchor="ctr"/>
+          <a:lstStyle/>
+          <a:p>
+            <a:pPr algn="ctr"/>
+            <a:endParaRPr lang="en-US" sz="1600" dirty="0" smtClean="0"/>
+          </a:p>
+        </p:txBody>
+      </p:sp>
+      <p:cxnSp>
+        <p:nvCxnSpPr>
+          <p:cNvPr id="45" name="Straight Arrow Connector 44"/>
+          <p:cNvCxnSpPr>
+            <a:endCxn id="44" idx="1"/>
+          </p:cNvCxnSpPr>
+          <p:nvPr/>
+        </p:nvCxnSpPr>
+        <p:spPr>
+          <a:xfrm>
+            <a:off x="4210541" y="3249311"/>
+            <a:ext cx="482839" cy="0"/>
+          </a:xfrm>
+          <a:prstGeom prst="straightConnector1">
+            <a:avLst/>
+          </a:prstGeom>
+          <a:ln>
+            <a:tailEnd type="arrow"/>
+          </a:ln>
+        </p:spPr>
+        <p:style>
+          <a:lnRef idx="2">
+            <a:schemeClr val="accent1"/>
+          </a:lnRef>
+          <a:fillRef idx="1">
+            <a:schemeClr val="lt1"/>
+          </a:fillRef>
+          <a:effectRef idx="0">
+            <a:schemeClr val="accent1"/>
+          </a:effectRef>
+          <a:fontRef idx="minor">
+            <a:schemeClr val="dk1"/>
+          </a:fontRef>
+        </p:style>
+      </p:cxnSp>
+      <p:sp>
+        <p:nvSpPr>
+          <p:cNvPr id="46" name="TextBox 45"/>
+          <p:cNvSpPr txBox="1"/>
+          <p:nvPr/>
+        </p:nvSpPr>
+        <p:spPr>
+          <a:xfrm>
+            <a:off x="3778942" y="2985895"/>
+            <a:ext cx="344039" cy="369332"/>
+          </a:xfrm>
+          <a:prstGeom prst="rect">
+            <a:avLst/>
+          </a:prstGeom>
+          <a:ln>
+            <a:noFill/>
+          </a:ln>
+        </p:spPr>
+        <p:style>
+          <a:lnRef idx="2">
+            <a:schemeClr val="accent1"/>
+          </a:lnRef>
+          <a:fillRef idx="1">
+            <a:schemeClr val="lt1"/>
+          </a:fillRef>
+          <a:effectRef idx="0">
+            <a:schemeClr val="accent1"/>
+          </a:effectRef>
+          <a:fontRef idx="minor">
+            <a:schemeClr val="dk1"/>
+          </a:fontRef>
+        </p:style>
+        <p:txBody>
+          <a:bodyPr wrap="none" rtlCol="0">
+            <a:spAutoFit/>
+          </a:bodyPr>
+          <a:lstStyle/>
+          <a:p>
+            <a:r>
+              <a:rPr lang="en-US" dirty="0" smtClean="0"/>
+              <a:t>…</a:t>
+            </a:r>
+            <a:endParaRPr lang="en-US" dirty="0"/>
+          </a:p>
+        </p:txBody>
+      </p:sp>
+      <p:sp>
+        <p:nvSpPr>
+          <p:cNvPr id="59" name="TextBox 58"/>
+          <p:cNvSpPr txBox="1"/>
+          <p:nvPr/>
+        </p:nvSpPr>
+        <p:spPr>
+          <a:xfrm>
+            <a:off x="3517720" y="1044222"/>
+            <a:ext cx="1880180" cy="369332"/>
+          </a:xfrm>
+          <a:prstGeom prst="rect">
+            <a:avLst/>
+          </a:prstGeom>
+          <a:noFill/>
+        </p:spPr>
+        <p:txBody>
+          <a:bodyPr wrap="none" rtlCol="0">
+            <a:spAutoFit/>
+          </a:bodyPr>
+          <a:lstStyle/>
+          <a:p>
+            <a:r>
+              <a:rPr lang="en-US" dirty="0" smtClean="0"/>
+              <a:t>Transformed into:</a:t>
+            </a:r>
+            <a:endParaRPr lang="en-US" dirty="0"/>
+          </a:p>
+        </p:txBody>
+      </p:sp>
+      <p:sp>
+        <p:nvSpPr>
+          <p:cNvPr id="60" name="Rounded Rectangle 59"/>
+          <p:cNvSpPr/>
+          <p:nvPr/>
+        </p:nvSpPr>
+        <p:spPr>
+          <a:xfrm>
+            <a:off x="5890338" y="275762"/>
+            <a:ext cx="1039118" cy="509316"/>
+          </a:xfrm>
+          <a:prstGeom prst="roundRect">
+            <a:avLst/>
+          </a:prstGeom>
+        </p:spPr>
+        <p:style>
+          <a:lnRef idx="2">
+            <a:schemeClr val="dk1"/>
+          </a:lnRef>
+          <a:fillRef idx="1">
+            <a:schemeClr val="lt1"/>
+          </a:fillRef>
+          <a:effectRef idx="0">
+            <a:schemeClr val="dk1"/>
+          </a:effectRef>
+          <a:fontRef idx="minor">
+            <a:schemeClr val="dk1"/>
+          </a:fontRef>
+        </p:style>
+        <p:txBody>
+          <a:bodyPr rtlCol="0" anchor="ctr"/>
+          <a:lstStyle/>
+          <a:p>
+            <a:pPr algn="ctr"/>
+            <a:r>
+              <a:rPr lang="en-US" sz="1600" dirty="0" smtClean="0"/>
+              <a:t>Join</a:t>
+            </a:r>
+            <a:endParaRPr lang="en-US" sz="1600" dirty="0"/>
+          </a:p>
+        </p:txBody>
+      </p:sp>
+      <p:cxnSp>
+        <p:nvCxnSpPr>
+          <p:cNvPr id="61" name="Straight Arrow Connector 60"/>
+          <p:cNvCxnSpPr>
+            <a:stCxn id="30" idx="3"/>
+            <a:endCxn id="60" idx="1"/>
+          </p:cNvCxnSpPr>
+          <p:nvPr/>
+        </p:nvCxnSpPr>
+        <p:spPr>
+          <a:xfrm>
+            <a:off x="5267233" y="528755"/>
+            <a:ext cx="623105" cy="1665"/>
+          </a:xfrm>
+          <a:prstGeom prst="straightConnector1">
+            <a:avLst/>
+          </a:prstGeom>
+          <a:ln>
+            <a:tailEnd type="arrow"/>
+          </a:ln>
+        </p:spPr>
+        <p:style>
+          <a:lnRef idx="2">
+            <a:schemeClr val="dk1"/>
+          </a:lnRef>
+          <a:fillRef idx="0">
+            <a:schemeClr val="dk1"/>
+          </a:fillRef>
+          <a:effectRef idx="1">
+            <a:schemeClr val="dk1"/>
+          </a:effectRef>
+          <a:fontRef idx="minor">
+            <a:schemeClr val="tx1"/>
+          </a:fontRef>
+        </p:style>
+      </p:cxnSp>
+      <p:sp>
+        <p:nvSpPr>
+          <p:cNvPr id="64" name="Rounded Rectangle 63"/>
+          <p:cNvSpPr/>
+          <p:nvPr/>
+        </p:nvSpPr>
+        <p:spPr>
+          <a:xfrm>
+            <a:off x="5890338" y="2373535"/>
+            <a:ext cx="1039118" cy="509316"/>
+          </a:xfrm>
+          <a:prstGeom prst="roundRect">
+            <a:avLst/>
+          </a:prstGeom>
+        </p:spPr>
+        <p:style>
+          <a:lnRef idx="2">
+            <a:schemeClr val="dk1"/>
+          </a:lnRef>
+          <a:fillRef idx="1">
+            <a:schemeClr val="lt1"/>
+          </a:fillRef>
+          <a:effectRef idx="0">
+            <a:schemeClr val="dk1"/>
+          </a:effectRef>
+          <a:fontRef idx="minor">
+            <a:schemeClr val="dk1"/>
+          </a:fontRef>
+        </p:style>
+        <p:txBody>
+          <a:bodyPr rtlCol="0" anchor="ctr"/>
+          <a:lstStyle/>
+          <a:p>
+            <a:pPr algn="ctr"/>
+            <a:r>
+              <a:rPr lang="en-US" sz="1600" dirty="0" smtClean="0"/>
+              <a:t>Join</a:t>
+            </a:r>
+            <a:endParaRPr lang="en-US" sz="1600" dirty="0"/>
+          </a:p>
+        </p:txBody>
+      </p:sp>
+      <p:cxnSp>
+        <p:nvCxnSpPr>
+          <p:cNvPr id="65" name="Straight Arrow Connector 64"/>
+          <p:cNvCxnSpPr>
+            <a:stCxn id="19" idx="3"/>
+            <a:endCxn id="64" idx="1"/>
+          </p:cNvCxnSpPr>
+          <p:nvPr/>
+        </p:nvCxnSpPr>
+        <p:spPr>
+          <a:xfrm>
+            <a:off x="5267233" y="2626528"/>
+            <a:ext cx="623105" cy="1665"/>
+          </a:xfrm>
+          <a:prstGeom prst="straightConnector1">
+            <a:avLst/>
+          </a:prstGeom>
+          <a:ln>
+            <a:tailEnd type="arrow"/>
+          </a:ln>
+        </p:spPr>
+        <p:style>
+          <a:lnRef idx="2">
+            <a:schemeClr val="dk1"/>
+          </a:lnRef>
+          <a:fillRef idx="0">
+            <a:schemeClr val="dk1"/>
+          </a:fillRef>
+          <a:effectRef idx="1">
+            <a:schemeClr val="dk1"/>
+          </a:effectRef>
+          <a:fontRef idx="minor">
+            <a:schemeClr val="tx1"/>
+          </a:fontRef>
+        </p:style>
+      </p:cxnSp>
+      <p:cxnSp>
+        <p:nvCxnSpPr>
+          <p:cNvPr id="68" name="Straight Arrow Connector 67"/>
+          <p:cNvCxnSpPr>
+            <a:stCxn id="44" idx="3"/>
+            <a:endCxn id="64" idx="1"/>
+          </p:cNvCxnSpPr>
+          <p:nvPr/>
+        </p:nvCxnSpPr>
+        <p:spPr>
+          <a:xfrm flipV="1">
+            <a:off x="5267233" y="2628193"/>
+            <a:ext cx="623105" cy="621118"/>
+          </a:xfrm>
+          <a:prstGeom prst="straightConnector1">
+            <a:avLst/>
+          </a:prstGeom>
+          <a:ln>
+            <a:tailEnd type="arrow"/>
+          </a:ln>
+        </p:spPr>
+        <p:style>
+          <a:lnRef idx="2">
+            <a:schemeClr val="dk1"/>
+          </a:lnRef>
+          <a:fillRef idx="0">
+            <a:schemeClr val="dk1"/>
+          </a:fillRef>
+          <a:effectRef idx="1">
+            <a:schemeClr val="dk1"/>
+          </a:effectRef>
+          <a:fontRef idx="minor">
+            <a:schemeClr val="tx1"/>
+          </a:fontRef>
+        </p:style>
+      </p:cxnSp>
+      <p:cxnSp>
+        <p:nvCxnSpPr>
+          <p:cNvPr id="71" name="Straight Arrow Connector 70"/>
+          <p:cNvCxnSpPr>
+            <a:stCxn id="37" idx="3"/>
+            <a:endCxn id="64" idx="1"/>
+          </p:cNvCxnSpPr>
+          <p:nvPr/>
+        </p:nvCxnSpPr>
+        <p:spPr>
+          <a:xfrm>
+            <a:off x="5254959" y="2007513"/>
+            <a:ext cx="635379" cy="620680"/>
+          </a:xfrm>
+          <a:prstGeom prst="straightConnector1">
+            <a:avLst/>
+          </a:prstGeom>
+          <a:ln>
+            <a:tailEnd type="arrow"/>
+          </a:ln>
+        </p:spPr>
+        <p:style>
+          <a:lnRef idx="2">
+            <a:schemeClr val="dk1"/>
+          </a:lnRef>
+          <a:fillRef idx="0">
+            <a:schemeClr val="dk1"/>
+          </a:fillRef>
+          <a:effectRef idx="1">
+            <a:schemeClr val="dk1"/>
+          </a:effectRef>
+          <a:fontRef idx="minor">
+            <a:schemeClr val="tx1"/>
+          </a:fontRef>
+        </p:style>
+      </p:cxnSp>
+    </p:spTree>
+    <p:extLst>
+      <p:ext uri="{BB962C8B-B14F-4D97-AF65-F5344CB8AC3E}">
+        <p14:creationId xmlns:p14="http://schemas.microsoft.com/office/powerpoint/2010/main" val="2773261832"/>
+      </p:ext>
+    </p:extLst>
+  </p:cSld>
+  <p:clrMapOvr>
+    <a:masterClrMapping/>
+  </p:clrMapOvr>
+</p:sld>
+</file>
+
+<file path=ppt/slides/slide3.xml><?xml version="1.0" encoding="utf-8"?>
+<p:sld xmlns:a="http://schemas.openxmlformats.org/drawingml/2006/main" xmlns:r="http://schemas.openxmlformats.org/officeDocument/2006/relationships" xmlns:p="http://schemas.openxmlformats.org/presentationml/2006/main">
+  <p:cSld>
+    <p:spTree>
+      <p:nvGrpSpPr>
+        <p:cNvPr id="1" name=""/>
+        <p:cNvGrpSpPr/>
+        <p:nvPr/>
+      </p:nvGrpSpPr>
+      <p:grpSpPr>
+        <a:xfrm>
+          <a:off x="0" y="0"/>
+          <a:ext cx="0" cy="0"/>
+          <a:chOff x="0" y="0"/>
+          <a:chExt cx="0" cy="0"/>
+        </a:xfrm>
+      </p:grpSpPr>
+      <p:sp>
+        <p:nvSpPr>
+          <p:cNvPr id="2" name="Title 1"/>
+          <p:cNvSpPr>
+            <a:spLocks noGrp="1"/>
+          </p:cNvSpPr>
+          <p:nvPr>
+            <p:ph type="title"/>
+          </p:nvPr>
+        </p:nvSpPr>
+        <p:spPr/>
+        <p:txBody>
+          <a:bodyPr/>
+          <a:lstStyle/>
+          <a:p>
+            <a:endParaRPr lang="en-US"/>
+          </a:p>
+        </p:txBody>
+      </p:sp>
+      <p:sp>
+        <p:nvSpPr>
+          <p:cNvPr id="3" name="Content Placeholder 2"/>
+          <p:cNvSpPr>
+            <a:spLocks noGrp="1"/>
+          </p:cNvSpPr>
+          <p:nvPr>
+            <p:ph idx="1"/>
+          </p:nvPr>
+        </p:nvSpPr>
+        <p:spPr/>
+        <p:txBody>
+          <a:bodyPr/>
+          <a:lstStyle/>
+          <a:p>
+            <a:endParaRPr lang="en-US"/>
+          </a:p>
+        </p:txBody>
+      </p:sp>
+    </p:spTree>
+    <p:extLst>
+      <p:ext uri="{BB962C8B-B14F-4D97-AF65-F5344CB8AC3E}">
+        <p14:creationId xmlns:p14="http://schemas.microsoft.com/office/powerpoint/2010/main" val="3901289006"/>
       </p:ext>
     </p:extLst>
   </p:cSld>

</xml_diff>